<commit_message>
oop/assoc./composition: correct the association label of sub-folder relation
</commit_message>
<xml_diff>
--- a/diagrams/oop/associations/composition/folder.pptx
+++ b/diagrams/oop/associations/composition/folder.pptx
@@ -104,6 +104,22 @@
       </a:defRPr>
     </a:lvl9pPr>
   </p:defaultTextStyle>
+  <p:extLst>
+    <p:ext uri="{EFAFB233-063F-42B5-8137-9DF3F51BA10A}">
+      <p15:sldGuideLst xmlns:p15="http://schemas.microsoft.com/office/powerpoint/2012/main">
+        <p15:guide id="1" orient="horz" pos="2160">
+          <p15:clr>
+            <a:srgbClr val="A4A3A4"/>
+          </p15:clr>
+        </p15:guide>
+        <p15:guide id="2" pos="2880">
+          <p15:clr>
+            <a:srgbClr val="A4A3A4"/>
+          </p15:clr>
+        </p15:guide>
+      </p15:sldGuideLst>
+    </p:ext>
+  </p:extLst>
 </p:presentation>
 </file>
 
@@ -288,7 +304,7 @@
           <a:p>
             <a:fld id="{0C6EA877-F4C0-48DC-ABA8-5780B1CCFE11}" type="datetimeFigureOut">
               <a:rPr lang="en-SG" smtClean="0"/>
-              <a:t>7/6/2017</a:t>
+              <a:t>24/11/2017</a:t>
             </a:fld>
             <a:endParaRPr lang="en-SG"/>
           </a:p>
@@ -458,7 +474,7 @@
           <a:p>
             <a:fld id="{0C6EA877-F4C0-48DC-ABA8-5780B1CCFE11}" type="datetimeFigureOut">
               <a:rPr lang="en-SG" smtClean="0"/>
-              <a:t>7/6/2017</a:t>
+              <a:t>24/11/2017</a:t>
             </a:fld>
             <a:endParaRPr lang="en-SG"/>
           </a:p>
@@ -638,7 +654,7 @@
           <a:p>
             <a:fld id="{0C6EA877-F4C0-48DC-ABA8-5780B1CCFE11}" type="datetimeFigureOut">
               <a:rPr lang="en-SG" smtClean="0"/>
-              <a:t>7/6/2017</a:t>
+              <a:t>24/11/2017</a:t>
             </a:fld>
             <a:endParaRPr lang="en-SG"/>
           </a:p>
@@ -808,7 +824,7 @@
           <a:p>
             <a:fld id="{0C6EA877-F4C0-48DC-ABA8-5780B1CCFE11}" type="datetimeFigureOut">
               <a:rPr lang="en-SG" smtClean="0"/>
-              <a:t>7/6/2017</a:t>
+              <a:t>24/11/2017</a:t>
             </a:fld>
             <a:endParaRPr lang="en-SG"/>
           </a:p>
@@ -1054,7 +1070,7 @@
           <a:p>
             <a:fld id="{0C6EA877-F4C0-48DC-ABA8-5780B1CCFE11}" type="datetimeFigureOut">
               <a:rPr lang="en-SG" smtClean="0"/>
-              <a:t>7/6/2017</a:t>
+              <a:t>24/11/2017</a:t>
             </a:fld>
             <a:endParaRPr lang="en-SG"/>
           </a:p>
@@ -1342,7 +1358,7 @@
           <a:p>
             <a:fld id="{0C6EA877-F4C0-48DC-ABA8-5780B1CCFE11}" type="datetimeFigureOut">
               <a:rPr lang="en-SG" smtClean="0"/>
-              <a:t>7/6/2017</a:t>
+              <a:t>24/11/2017</a:t>
             </a:fld>
             <a:endParaRPr lang="en-SG"/>
           </a:p>
@@ -1764,7 +1780,7 @@
           <a:p>
             <a:fld id="{0C6EA877-F4C0-48DC-ABA8-5780B1CCFE11}" type="datetimeFigureOut">
               <a:rPr lang="en-SG" smtClean="0"/>
-              <a:t>7/6/2017</a:t>
+              <a:t>24/11/2017</a:t>
             </a:fld>
             <a:endParaRPr lang="en-SG"/>
           </a:p>
@@ -1882,7 +1898,7 @@
           <a:p>
             <a:fld id="{0C6EA877-F4C0-48DC-ABA8-5780B1CCFE11}" type="datetimeFigureOut">
               <a:rPr lang="en-SG" smtClean="0"/>
-              <a:t>7/6/2017</a:t>
+              <a:t>24/11/2017</a:t>
             </a:fld>
             <a:endParaRPr lang="en-SG"/>
           </a:p>
@@ -1977,7 +1993,7 @@
           <a:p>
             <a:fld id="{0C6EA877-F4C0-48DC-ABA8-5780B1CCFE11}" type="datetimeFigureOut">
               <a:rPr lang="en-SG" smtClean="0"/>
-              <a:t>7/6/2017</a:t>
+              <a:t>24/11/2017</a:t>
             </a:fld>
             <a:endParaRPr lang="en-SG"/>
           </a:p>
@@ -2254,7 +2270,7 @@
           <a:p>
             <a:fld id="{0C6EA877-F4C0-48DC-ABA8-5780B1CCFE11}" type="datetimeFigureOut">
               <a:rPr lang="en-SG" smtClean="0"/>
-              <a:t>7/6/2017</a:t>
+              <a:t>24/11/2017</a:t>
             </a:fld>
             <a:endParaRPr lang="en-SG"/>
           </a:p>
@@ -2507,7 +2523,7 @@
           <a:p>
             <a:fld id="{0C6EA877-F4C0-48DC-ABA8-5780B1CCFE11}" type="datetimeFigureOut">
               <a:rPr lang="en-SG" smtClean="0"/>
-              <a:t>7/6/2017</a:t>
+              <a:t>24/11/2017</a:t>
             </a:fld>
             <a:endParaRPr lang="en-SG"/>
           </a:p>
@@ -2720,7 +2736,7 @@
           <a:p>
             <a:fld id="{0C6EA877-F4C0-48DC-ABA8-5780B1CCFE11}" type="datetimeFigureOut">
               <a:rPr lang="en-SG" smtClean="0"/>
-              <a:t>7/6/2017</a:t>
+              <a:t>24/11/2017</a:t>
             </a:fld>
             <a:endParaRPr lang="en-SG"/>
           </a:p>
@@ -3310,8 +3326,54 @@
                 <a:uFillTx/>
                 <a:latin typeface="Calibri" pitchFamily="34" charset="0"/>
               </a:rPr>
-              <a:t>       is a sub-folder of &gt;</a:t>
-            </a:r>
+              <a:t>       is a sub-folder of </a:t>
+            </a:r>
+          </a:p>
+        </p:txBody>
+      </p:sp>
+      <p:sp>
+        <p:nvSpPr>
+          <p:cNvPr id="2" name="Isosceles Triangle 1"/>
+          <p:cNvSpPr/>
+          <p:nvPr/>
+        </p:nvSpPr>
+        <p:spPr>
+          <a:xfrm rot="16200000">
+            <a:off x="3619617" y="3485920"/>
+            <a:ext cx="130924" cy="98365"/>
+          </a:xfrm>
+          <a:prstGeom prst="triangle">
+            <a:avLst/>
+          </a:prstGeom>
+          <a:solidFill>
+            <a:schemeClr val="tx1"/>
+          </a:solidFill>
+          <a:ln>
+            <a:noFill/>
+          </a:ln>
+        </p:spPr>
+        <p:style>
+          <a:lnRef idx="2">
+            <a:schemeClr val="accent1">
+              <a:shade val="50000"/>
+            </a:schemeClr>
+          </a:lnRef>
+          <a:fillRef idx="1">
+            <a:schemeClr val="accent1"/>
+          </a:fillRef>
+          <a:effectRef idx="0">
+            <a:schemeClr val="accent1"/>
+          </a:effectRef>
+          <a:fontRef idx="minor">
+            <a:schemeClr val="lt1"/>
+          </a:fontRef>
+        </p:style>
+        <p:txBody>
+          <a:bodyPr rtlCol="0" anchor="ctr"/>
+          <a:lstStyle/>
+          <a:p>
+            <a:pPr algn="ctr"/>
+            <a:endParaRPr lang="en-US"/>
           </a:p>
         </p:txBody>
       </p:sp>

</xml_diff>